<commit_message>
update Loops.pptx and white Loops.pptx
</commit_message>
<xml_diff>
--- a/Front-end/_Demos JS Fundamentals/06. Loops/Loops.pptx
+++ b/Front-end/_Demos JS Fundamentals/06. Loops/Loops.pptx
@@ -187,7 +187,7 @@
   </p:defaultTextStyle>
   <p:extLst>
     <p:ext uri="{EFAFB233-063F-42B5-8137-9DF3F51BA10A}">
-      <p15:sldGuideLst xmlns:p15="http://schemas.microsoft.com/office/powerpoint/2012/main">
+      <p15:sldGuideLst xmlns:p15="http://schemas.microsoft.com/office/powerpoint/2012/main" xmlns="">
         <p15:guide id="1" orient="horz" pos="2160">
           <p15:clr>
             <a:srgbClr val="A4A3A4"/>
@@ -201,7 +201,7 @@
       </p15:sldGuideLst>
     </p:ext>
     <p:ext uri="{2D200454-40CA-4A62-9FC3-DE9A4176ACB9}">
-      <p15:notesGuideLst xmlns:p15="http://schemas.microsoft.com/office/powerpoint/2012/main">
+      <p15:notesGuideLst xmlns:p15="http://schemas.microsoft.com/office/powerpoint/2012/main" xmlns="">
         <p15:guide id="1" orient="horz" pos="2928">
           <p15:clr>
             <a:srgbClr val="A4A3A4"/>
@@ -333,7 +333,7 @@
             <a:fld id="{3BF7C7B5-275F-4D1F-9AB4-9255447DBC73}" type="datetimeFigureOut">
               <a:rPr lang="en-US"/>
               <a:pPr/>
-              <a:t>5/14/2015</a:t>
+              <a:t>6/24/2016</a:t>
             </a:fld>
             <a:endParaRPr lang="en-US" dirty="0"/>
           </a:p>
@@ -441,7 +441,7 @@
     </p:spTree>
     <p:extLst>
       <p:ext uri="{BB962C8B-B14F-4D97-AF65-F5344CB8AC3E}">
-        <p14:creationId xmlns:p14="http://schemas.microsoft.com/office/powerpoint/2010/main" val="3805506729"/>
+        <p14:creationId xmlns:p14="http://schemas.microsoft.com/office/powerpoint/2010/main" xmlns="" val="3805506729"/>
       </p:ext>
     </p:extLst>
   </p:cSld>
@@ -564,7 +564,7 @@
             <a:fld id="{9B46F231-FB2B-4655-A644-E2477325E686}" type="datetimeFigureOut">
               <a:rPr lang="en-US"/>
               <a:pPr/>
-              <a:t>5/14/2015</a:t>
+              <a:t>6/24/2016</a:t>
             </a:fld>
             <a:endParaRPr lang="en-US" dirty="0"/>
           </a:p>
@@ -777,7 +777,7 @@
     </p:spTree>
     <p:extLst>
       <p:ext uri="{BB962C8B-B14F-4D97-AF65-F5344CB8AC3E}">
-        <p14:creationId xmlns:p14="http://schemas.microsoft.com/office/powerpoint/2010/main" val="1647598977"/>
+        <p14:creationId xmlns:p14="http://schemas.microsoft.com/office/powerpoint/2010/main" xmlns="" val="1647598977"/>
       </p:ext>
     </p:extLst>
   </p:cSld>
@@ -1037,7 +1037,7 @@
     </p:spTree>
     <p:extLst>
       <p:ext uri="{BB962C8B-B14F-4D97-AF65-F5344CB8AC3E}">
-        <p14:creationId xmlns:p14="http://schemas.microsoft.com/office/powerpoint/2010/main" val="2997747266"/>
+        <p14:creationId xmlns:p14="http://schemas.microsoft.com/office/powerpoint/2010/main" xmlns="" val="2997747266"/>
       </p:ext>
     </p:extLst>
   </p:cSld>
@@ -1177,7 +1177,7 @@
     </p:spTree>
     <p:extLst>
       <p:ext uri="{BB962C8B-B14F-4D97-AF65-F5344CB8AC3E}">
-        <p14:creationId xmlns:p14="http://schemas.microsoft.com/office/powerpoint/2010/main" val="2811178852"/>
+        <p14:creationId xmlns:p14="http://schemas.microsoft.com/office/powerpoint/2010/main" xmlns="" val="2811178852"/>
       </p:ext>
     </p:extLst>
   </p:cSld>
@@ -1317,7 +1317,7 @@
     </p:spTree>
     <p:extLst>
       <p:ext uri="{BB962C8B-B14F-4D97-AF65-F5344CB8AC3E}">
-        <p14:creationId xmlns:p14="http://schemas.microsoft.com/office/powerpoint/2010/main" val="3688059041"/>
+        <p14:creationId xmlns:p14="http://schemas.microsoft.com/office/powerpoint/2010/main" xmlns="" val="3688059041"/>
       </p:ext>
     </p:extLst>
   </p:cSld>
@@ -1457,7 +1457,7 @@
     </p:spTree>
     <p:extLst>
       <p:ext uri="{BB962C8B-B14F-4D97-AF65-F5344CB8AC3E}">
-        <p14:creationId xmlns:p14="http://schemas.microsoft.com/office/powerpoint/2010/main" val="3877705208"/>
+        <p14:creationId xmlns:p14="http://schemas.microsoft.com/office/powerpoint/2010/main" xmlns="" val="3877705208"/>
       </p:ext>
     </p:extLst>
   </p:cSld>
@@ -1597,7 +1597,7 @@
     </p:spTree>
     <p:extLst>
       <p:ext uri="{BB962C8B-B14F-4D97-AF65-F5344CB8AC3E}">
-        <p14:creationId xmlns:p14="http://schemas.microsoft.com/office/powerpoint/2010/main" val="1962751903"/>
+        <p14:creationId xmlns:p14="http://schemas.microsoft.com/office/powerpoint/2010/main" xmlns="" val="1962751903"/>
       </p:ext>
     </p:extLst>
   </p:cSld>
@@ -1737,7 +1737,7 @@
     </p:spTree>
     <p:extLst>
       <p:ext uri="{BB962C8B-B14F-4D97-AF65-F5344CB8AC3E}">
-        <p14:creationId xmlns:p14="http://schemas.microsoft.com/office/powerpoint/2010/main" val="1303389398"/>
+        <p14:creationId xmlns:p14="http://schemas.microsoft.com/office/powerpoint/2010/main" xmlns="" val="1303389398"/>
       </p:ext>
     </p:extLst>
   </p:cSld>
@@ -1877,7 +1877,7 @@
     </p:spTree>
     <p:extLst>
       <p:ext uri="{BB962C8B-B14F-4D97-AF65-F5344CB8AC3E}">
-        <p14:creationId xmlns:p14="http://schemas.microsoft.com/office/powerpoint/2010/main" val="2667980521"/>
+        <p14:creationId xmlns:p14="http://schemas.microsoft.com/office/powerpoint/2010/main" xmlns="" val="2667980521"/>
       </p:ext>
     </p:extLst>
   </p:cSld>
@@ -2017,7 +2017,7 @@
     </p:spTree>
     <p:extLst>
       <p:ext uri="{BB962C8B-B14F-4D97-AF65-F5344CB8AC3E}">
-        <p14:creationId xmlns:p14="http://schemas.microsoft.com/office/powerpoint/2010/main" val="761994980"/>
+        <p14:creationId xmlns:p14="http://schemas.microsoft.com/office/powerpoint/2010/main" xmlns="" val="761994980"/>
       </p:ext>
     </p:extLst>
   </p:cSld>
@@ -2157,7 +2157,7 @@
     </p:spTree>
     <p:extLst>
       <p:ext uri="{BB962C8B-B14F-4D97-AF65-F5344CB8AC3E}">
-        <p14:creationId xmlns:p14="http://schemas.microsoft.com/office/powerpoint/2010/main" val="1540876721"/>
+        <p14:creationId xmlns:p14="http://schemas.microsoft.com/office/powerpoint/2010/main" xmlns="" val="1540876721"/>
       </p:ext>
     </p:extLst>
   </p:cSld>
@@ -2297,7 +2297,7 @@
     </p:spTree>
     <p:extLst>
       <p:ext uri="{BB962C8B-B14F-4D97-AF65-F5344CB8AC3E}">
-        <p14:creationId xmlns:p14="http://schemas.microsoft.com/office/powerpoint/2010/main" val="1475813609"/>
+        <p14:creationId xmlns:p14="http://schemas.microsoft.com/office/powerpoint/2010/main" xmlns="" val="1475813609"/>
       </p:ext>
     </p:extLst>
   </p:cSld>
@@ -2437,7 +2437,7 @@
     </p:spTree>
     <p:extLst>
       <p:ext uri="{BB962C8B-B14F-4D97-AF65-F5344CB8AC3E}">
-        <p14:creationId xmlns:p14="http://schemas.microsoft.com/office/powerpoint/2010/main" val="3361634523"/>
+        <p14:creationId xmlns:p14="http://schemas.microsoft.com/office/powerpoint/2010/main" xmlns="" val="3361634523"/>
       </p:ext>
     </p:extLst>
   </p:cSld>
@@ -2577,7 +2577,7 @@
     </p:spTree>
     <p:extLst>
       <p:ext uri="{BB962C8B-B14F-4D97-AF65-F5344CB8AC3E}">
-        <p14:creationId xmlns:p14="http://schemas.microsoft.com/office/powerpoint/2010/main" val="215623486"/>
+        <p14:creationId xmlns:p14="http://schemas.microsoft.com/office/powerpoint/2010/main" xmlns="" val="215623486"/>
       </p:ext>
     </p:extLst>
   </p:cSld>
@@ -2717,7 +2717,7 @@
     </p:spTree>
     <p:extLst>
       <p:ext uri="{BB962C8B-B14F-4D97-AF65-F5344CB8AC3E}">
-        <p14:creationId xmlns:p14="http://schemas.microsoft.com/office/powerpoint/2010/main" val="3820533105"/>
+        <p14:creationId xmlns:p14="http://schemas.microsoft.com/office/powerpoint/2010/main" xmlns="" val="3820533105"/>
       </p:ext>
     </p:extLst>
   </p:cSld>
@@ -2857,7 +2857,7 @@
     </p:spTree>
     <p:extLst>
       <p:ext uri="{BB962C8B-B14F-4D97-AF65-F5344CB8AC3E}">
-        <p14:creationId xmlns:p14="http://schemas.microsoft.com/office/powerpoint/2010/main" val="1290280298"/>
+        <p14:creationId xmlns:p14="http://schemas.microsoft.com/office/powerpoint/2010/main" xmlns="" val="1290280298"/>
       </p:ext>
     </p:extLst>
   </p:cSld>
@@ -2997,7 +2997,7 @@
     </p:spTree>
     <p:extLst>
       <p:ext uri="{BB962C8B-B14F-4D97-AF65-F5344CB8AC3E}">
-        <p14:creationId xmlns:p14="http://schemas.microsoft.com/office/powerpoint/2010/main" val="2635670043"/>
+        <p14:creationId xmlns:p14="http://schemas.microsoft.com/office/powerpoint/2010/main" xmlns="" val="2635670043"/>
       </p:ext>
     </p:extLst>
   </p:cSld>
@@ -3137,7 +3137,7 @@
     </p:spTree>
     <p:extLst>
       <p:ext uri="{BB962C8B-B14F-4D97-AF65-F5344CB8AC3E}">
-        <p14:creationId xmlns:p14="http://schemas.microsoft.com/office/powerpoint/2010/main" val="1265499917"/>
+        <p14:creationId xmlns:p14="http://schemas.microsoft.com/office/powerpoint/2010/main" xmlns="" val="1265499917"/>
       </p:ext>
     </p:extLst>
   </p:cSld>
@@ -4473,7 +4473,7 @@
     </p:spTree>
     <p:extLst>
       <p:ext uri="{BB962C8B-B14F-4D97-AF65-F5344CB8AC3E}">
-        <p14:creationId xmlns:p14="http://schemas.microsoft.com/office/powerpoint/2010/main" val="3141685506"/>
+        <p14:creationId xmlns:p14="http://schemas.microsoft.com/office/powerpoint/2010/main" xmlns="" val="3141685506"/>
       </p:ext>
     </p:extLst>
   </p:cSld>
@@ -8411,10 +8411,10 @@
           <p:nvPr/>
         </p:nvPicPr>
         <p:blipFill>
-          <a:blip r:embed="rId29">
+          <a:blip r:embed="rId29" cstate="print">
             <a:extLst>
               <a:ext uri="{28A0092B-C50C-407E-A947-70E740481C1C}">
-                <a14:useLocalDpi xmlns:a14="http://schemas.microsoft.com/office/drawing/2010/main" val="0"/>
+                <a14:useLocalDpi xmlns:a14="http://schemas.microsoft.com/office/drawing/2010/main" xmlns="" val="0"/>
               </a:ext>
             </a:extLst>
           </a:blip>
@@ -8434,7 +8434,7 @@
           <a:noFill/>
           <a:extLst>
             <a:ext uri="{909E8E84-426E-40DD-AFC4-6F175D3DCCD1}">
-              <a14:hiddenFill xmlns:a14="http://schemas.microsoft.com/office/drawing/2010/main">
+              <a14:hiddenFill xmlns:a14="http://schemas.microsoft.com/office/drawing/2010/main" xmlns="">
                 <a:solidFill>
                   <a:srgbClr val="FFFFFF"/>
                 </a:solidFill>
@@ -8455,7 +8455,7 @@
           <a:blip r:embed="rId30" cstate="email">
             <a:extLst>
               <a:ext uri="{28A0092B-C50C-407E-A947-70E740481C1C}">
-                <a14:useLocalDpi xmlns:a14="http://schemas.microsoft.com/office/drawing/2010/main"/>
+                <a14:useLocalDpi xmlns:a14="http://schemas.microsoft.com/office/drawing/2010/main" xmlns=""/>
               </a:ext>
             </a:extLst>
           </a:blip>
@@ -8479,14 +8479,14 @@
           <a:effectLst/>
           <a:extLst>
             <a:ext uri="{909E8E84-426E-40DD-AFC4-6F175D3DCCD1}">
-              <a14:hiddenFill xmlns:a14="http://schemas.microsoft.com/office/drawing/2010/main">
+              <a14:hiddenFill xmlns:a14="http://schemas.microsoft.com/office/drawing/2010/main" xmlns="">
                 <a:solidFill>
                   <a:schemeClr val="accent1"/>
                 </a:solidFill>
               </a14:hiddenFill>
             </a:ext>
             <a:ext uri="{91240B29-F687-4F45-9708-019B960494DF}">
-              <a14:hiddenLine xmlns:a14="http://schemas.microsoft.com/office/drawing/2010/main" w="9525">
+              <a14:hiddenLine xmlns:a14="http://schemas.microsoft.com/office/drawing/2010/main" xmlns="" w="9525">
                 <a:solidFill>
                   <a:schemeClr val="tx1"/>
                 </a:solidFill>
@@ -8496,7 +8496,7 @@
               </a14:hiddenLine>
             </a:ext>
             <a:ext uri="{AF507438-7753-43E0-B8FC-AC1667EBCBE1}">
-              <a14:hiddenEffects xmlns:a14="http://schemas.microsoft.com/office/drawing/2010/main">
+              <a14:hiddenEffects xmlns:a14="http://schemas.microsoft.com/office/drawing/2010/main" xmlns="">
                 <a:effectLst>
                   <a:outerShdw dist="35921" dir="2700000" algn="ctr" rotWithShape="0">
                     <a:schemeClr val="bg2"/>
@@ -8519,7 +8519,7 @@
           <a:blip r:embed="rId31" cstate="email">
             <a:extLst>
               <a:ext uri="{28A0092B-C50C-407E-A947-70E740481C1C}">
-                <a14:useLocalDpi xmlns:a14="http://schemas.microsoft.com/office/drawing/2010/main"/>
+                <a14:useLocalDpi xmlns:a14="http://schemas.microsoft.com/office/drawing/2010/main" xmlns=""/>
               </a:ext>
             </a:extLst>
           </a:blip>
@@ -8543,14 +8543,14 @@
           <a:effectLst/>
           <a:extLst>
             <a:ext uri="{909E8E84-426E-40DD-AFC4-6F175D3DCCD1}">
-              <a14:hiddenFill xmlns:a14="http://schemas.microsoft.com/office/drawing/2010/main">
+              <a14:hiddenFill xmlns:a14="http://schemas.microsoft.com/office/drawing/2010/main" xmlns="">
                 <a:solidFill>
                   <a:schemeClr val="accent1"/>
                 </a:solidFill>
               </a14:hiddenFill>
             </a:ext>
             <a:ext uri="{91240B29-F687-4F45-9708-019B960494DF}">
-              <a14:hiddenLine xmlns:a14="http://schemas.microsoft.com/office/drawing/2010/main" w="9525">
+              <a14:hiddenLine xmlns:a14="http://schemas.microsoft.com/office/drawing/2010/main" xmlns="" w="9525">
                 <a:solidFill>
                   <a:schemeClr val="tx1"/>
                 </a:solidFill>
@@ -8560,7 +8560,7 @@
               </a14:hiddenLine>
             </a:ext>
             <a:ext uri="{AF507438-7753-43E0-B8FC-AC1667EBCBE1}">
-              <a14:hiddenEffects xmlns:a14="http://schemas.microsoft.com/office/drawing/2010/main">
+              <a14:hiddenEffects xmlns:a14="http://schemas.microsoft.com/office/drawing/2010/main" xmlns="">
                 <a:effectLst>
                   <a:outerShdw dist="35921" dir="2700000" algn="ctr" rotWithShape="0">
                     <a:schemeClr val="bg2"/>
@@ -8573,17 +8573,17 @@
       </p:pic>
       <p:pic>
         <p:nvPicPr>
-          <p:cNvPr id="6146" name="Picture 2" descr="Telerik Academy for Software Engineers - http://academy.telerik.com" title="Telerik Software Academy"/>
+          <p:cNvPr id="6146" name="Picture 2" descr="Telerik Academy for Software Engineers - http://academy.telerik.com"/>
           <p:cNvPicPr>
             <a:picLocks noChangeAspect="1" noChangeArrowheads="1"/>
           </p:cNvPicPr>
           <p:nvPr/>
         </p:nvPicPr>
         <p:blipFill>
-          <a:blip r:embed="rId32">
+          <a:blip r:embed="rId32" cstate="print">
             <a:extLst>
               <a:ext uri="{BEBA8EAE-BF5A-486C-A8C5-ECC9F3942E4B}">
-                <a14:imgProps xmlns:a14="http://schemas.microsoft.com/office/drawing/2010/main">
+                <a14:imgProps xmlns:a14="http://schemas.microsoft.com/office/drawing/2010/main" xmlns="">
                   <a14:imgLayer r:embed="rId33">
                     <a14:imgEffect>
                       <a14:brightnessContrast bright="20000"/>
@@ -8592,7 +8592,7 @@
                 </a14:imgProps>
               </a:ext>
               <a:ext uri="{28A0092B-C50C-407E-A947-70E740481C1C}">
-                <a14:useLocalDpi xmlns:a14="http://schemas.microsoft.com/office/drawing/2010/main" val="0"/>
+                <a14:useLocalDpi xmlns:a14="http://schemas.microsoft.com/office/drawing/2010/main" xmlns="" val="0"/>
               </a:ext>
             </a:extLst>
           </a:blip>
@@ -8620,7 +8620,7 @@
           </a:effectLst>
           <a:extLst>
             <a:ext uri="{909E8E84-426E-40DD-AFC4-6F175D3DCCD1}">
-              <a14:hiddenFill xmlns:a14="http://schemas.microsoft.com/office/drawing/2010/main">
+              <a14:hiddenFill xmlns:a14="http://schemas.microsoft.com/office/drawing/2010/main" xmlns="">
                 <a:solidFill>
                   <a:srgbClr val="FFFFFF"/>
                 </a:solidFill>
@@ -12477,7 +12477,7 @@
         <p:spPr bwMode="auto">
           <a:xfrm>
             <a:off x="754062" y="1828800"/>
-            <a:ext cx="7489825" cy="1323439"/>
+            <a:ext cx="7489825" cy="1015663"/>
           </a:xfrm>
           <a:prstGeom prst="rect">
             <a:avLst/>
@@ -12601,34 +12601,6 @@
               <a:buSzPct val="70000"/>
             </a:pPr>
             <a:r>
-              <a:rPr lang="en-US" sz="2000" b="1" noProof="1">
-                <a:solidFill>
-                  <a:srgbClr val="8CF4F2"/>
-                </a:solidFill>
-                <a:effectLst>
-                  <a:outerShdw blurRad="38100" dist="38100" dir="2700000" algn="tl">
-                    <a:srgbClr val="000000">
-                      <a:alpha val="43137"/>
-                    </a:srgbClr>
-                  </a:outerShdw>
-                </a:effectLst>
-                <a:latin typeface="Consolas" pitchFamily="49" charset="0"/>
-                <a:cs typeface="Consolas" pitchFamily="49" charset="0"/>
-              </a:rPr>
-              <a:t>}</a:t>
-            </a:r>
-          </a:p>
-          <a:p>
-            <a:pPr lvl="1" eaLnBrk="0" hangingPunct="0">
-              <a:buClr>
-                <a:schemeClr val="accent5">
-                  <a:lumMod val="40000"/>
-                  <a:lumOff val="60000"/>
-                </a:schemeClr>
-              </a:buClr>
-              <a:buSzPct val="70000"/>
-            </a:pPr>
-            <a:r>
               <a:rPr lang="en-US" sz="2000" b="1" noProof="1" smtClean="0">
                 <a:solidFill>
                   <a:srgbClr val="8CF4F2"/>
@@ -12643,7 +12615,24 @@
                 <a:latin typeface="Consolas" pitchFamily="49" charset="0"/>
                 <a:cs typeface="Consolas" pitchFamily="49" charset="0"/>
               </a:rPr>
-              <a:t>while (condition);</a:t>
+              <a:t>} while </a:t>
+            </a:r>
+            <a:r>
+              <a:rPr lang="en-US" sz="2000" b="1" noProof="1" smtClean="0">
+                <a:solidFill>
+                  <a:srgbClr val="8CF4F2"/>
+                </a:solidFill>
+                <a:effectLst>
+                  <a:outerShdw blurRad="38100" dist="38100" dir="2700000" algn="tl">
+                    <a:srgbClr val="000000">
+                      <a:alpha val="43137"/>
+                    </a:srgbClr>
+                  </a:outerShdw>
+                </a:effectLst>
+                <a:latin typeface="Consolas" pitchFamily="49" charset="0"/>
+                <a:cs typeface="Consolas" pitchFamily="49" charset="0"/>
+              </a:rPr>
+              <a:t>(condition);</a:t>
             </a:r>
             <a:endParaRPr lang="en-US" sz="2000" b="1" noProof="1">
               <a:solidFill>
@@ -23570,7 +23559,7 @@
     </p:spTree>
     <p:extLst>
       <p:ext uri="{BB962C8B-B14F-4D97-AF65-F5344CB8AC3E}">
-        <p14:creationId xmlns:p14="http://schemas.microsoft.com/office/powerpoint/2010/main" val="511107845"/>
+        <p14:creationId xmlns:p14="http://schemas.microsoft.com/office/powerpoint/2010/main" xmlns="" val="511107845"/>
       </p:ext>
     </p:extLst>
   </p:cSld>
@@ -23777,7 +23766,7 @@
     </p:spTree>
     <p:extLst>
       <p:ext uri="{BB962C8B-B14F-4D97-AF65-F5344CB8AC3E}">
-        <p14:creationId xmlns:p14="http://schemas.microsoft.com/office/powerpoint/2010/main" val="986943213"/>
+        <p14:creationId xmlns:p14="http://schemas.microsoft.com/office/powerpoint/2010/main" xmlns="" val="986943213"/>
       </p:ext>
     </p:extLst>
   </p:cSld>
@@ -24336,7 +24325,7 @@
     </p:spTree>
     <p:extLst>
       <p:ext uri="{BB962C8B-B14F-4D97-AF65-F5344CB8AC3E}">
-        <p14:creationId xmlns:p14="http://schemas.microsoft.com/office/powerpoint/2010/main" val="4229004850"/>
+        <p14:creationId xmlns:p14="http://schemas.microsoft.com/office/powerpoint/2010/main" xmlns="" val="4229004850"/>
       </p:ext>
     </p:extLst>
   </p:cSld>
@@ -24416,7 +24405,7 @@
     </p:spTree>
     <p:extLst>
       <p:ext uri="{BB962C8B-B14F-4D97-AF65-F5344CB8AC3E}">
-        <p14:creationId xmlns:p14="http://schemas.microsoft.com/office/powerpoint/2010/main" val="1686141172"/>
+        <p14:creationId xmlns:p14="http://schemas.microsoft.com/office/powerpoint/2010/main" xmlns="" val="1686141172"/>
       </p:ext>
     </p:extLst>
   </p:cSld>
@@ -25012,7 +25001,7 @@
       </p:sp>
       <p:pic>
         <p:nvPicPr>
-          <p:cNvPr id="5" name="Picture 5" descr="http://academy.telerik.com" title="Telerik Software Academy - free Training for Ninja Developers">
+          <p:cNvPr id="5" name="Picture 5" descr="http://academy.telerik.com">
             <a:hlinkClick r:id="rId5" tooltip="Telerik Software Academy Forums - Discussion Board for Developers"/>
           </p:cNvPr>
           <p:cNvPicPr>
@@ -25021,10 +25010,10 @@
           <p:nvPr/>
         </p:nvPicPr>
         <p:blipFill>
-          <a:blip r:embed="rId6">
+          <a:blip r:embed="rId6" cstate="print">
             <a:extLst>
               <a:ext uri="{28A0092B-C50C-407E-A947-70E740481C1C}">
-                <a14:useLocalDpi xmlns:a14="http://schemas.microsoft.com/office/drawing/2010/main" val="0"/>
+                <a14:useLocalDpi xmlns:a14="http://schemas.microsoft.com/office/drawing/2010/main" xmlns="" val="0"/>
               </a:ext>
             </a:extLst>
           </a:blip>
@@ -25048,14 +25037,14 @@
           <a:effectLst/>
           <a:extLst>
             <a:ext uri="{909E8E84-426E-40DD-AFC4-6F175D3DCCD1}">
-              <a14:hiddenFill xmlns:a14="http://schemas.microsoft.com/office/drawing/2010/main">
+              <a14:hiddenFill xmlns:a14="http://schemas.microsoft.com/office/drawing/2010/main" xmlns="">
                 <a:solidFill>
                   <a:schemeClr val="accent1"/>
                 </a:solidFill>
               </a14:hiddenFill>
             </a:ext>
             <a:ext uri="{91240B29-F687-4F45-9708-019B960494DF}">
-              <a14:hiddenLine xmlns:a14="http://schemas.microsoft.com/office/drawing/2010/main" w="9525">
+              <a14:hiddenLine xmlns:a14="http://schemas.microsoft.com/office/drawing/2010/main" xmlns="" w="9525">
                 <a:solidFill>
                   <a:schemeClr val="tx1"/>
                 </a:solidFill>
@@ -25065,7 +25054,7 @@
               </a14:hiddenLine>
             </a:ext>
             <a:ext uri="{AF507438-7753-43E0-B8FC-AC1667EBCBE1}">
-              <a14:hiddenEffects xmlns:a14="http://schemas.microsoft.com/office/drawing/2010/main">
+              <a14:hiddenEffects xmlns:a14="http://schemas.microsoft.com/office/drawing/2010/main" xmlns="">
                 <a:effectLst>
                   <a:outerShdw dist="35921" dir="2700000" algn="ctr" rotWithShape="0">
                     <a:schemeClr val="bg2"/>
@@ -25078,7 +25067,7 @@
       </p:pic>
       <p:pic>
         <p:nvPicPr>
-          <p:cNvPr id="1028" name="Picture 4" descr="http://academy.telerik.com/" title="Telerik Software Academy">
+          <p:cNvPr id="1028" name="Picture 4" descr="http://academy.telerik.com/">
             <a:hlinkClick r:id="rId3" tooltip="Telerik Software Academy"/>
           </p:cNvPr>
           <p:cNvPicPr>
@@ -25087,10 +25076,10 @@
           <p:nvPr/>
         </p:nvPicPr>
         <p:blipFill>
-          <a:blip r:embed="rId7">
+          <a:blip r:embed="rId7" cstate="print">
             <a:extLst>
               <a:ext uri="{28A0092B-C50C-407E-A947-70E740481C1C}">
-                <a14:useLocalDpi xmlns:a14="http://schemas.microsoft.com/office/drawing/2010/main" val="0"/>
+                <a14:useLocalDpi xmlns:a14="http://schemas.microsoft.com/office/drawing/2010/main" xmlns="" val="0"/>
               </a:ext>
             </a:extLst>
           </a:blip>
@@ -25115,7 +25104,7 @@
           </a:ln>
           <a:extLst>
             <a:ext uri="{909E8E84-426E-40DD-AFC4-6F175D3DCCD1}">
-              <a14:hiddenFill xmlns:a14="http://schemas.microsoft.com/office/drawing/2010/main">
+              <a14:hiddenFill xmlns:a14="http://schemas.microsoft.com/office/drawing/2010/main" xmlns="">
                 <a:solidFill>
                   <a:srgbClr val="FFFFFF"/>
                 </a:solidFill>
@@ -25126,7 +25115,7 @@
       </p:pic>
       <p:pic>
         <p:nvPicPr>
-          <p:cNvPr id="1037" name="Picture 13" descr="http://facebook.com/TelerikAcademy" title="Telerik Software Academy @ Facebook">
+          <p:cNvPr id="1037" name="Picture 13" descr="http://facebook.com/TelerikAcademy">
             <a:hlinkClick r:id="rId8" tooltip="Telerik Academy @ Facebook"/>
           </p:cNvPr>
           <p:cNvPicPr>
@@ -25135,10 +25124,10 @@
           <p:nvPr/>
         </p:nvPicPr>
         <p:blipFill>
-          <a:blip r:embed="rId9">
+          <a:blip r:embed="rId9" cstate="print">
             <a:extLst>
               <a:ext uri="{28A0092B-C50C-407E-A947-70E740481C1C}">
-                <a14:useLocalDpi xmlns:a14="http://schemas.microsoft.com/office/drawing/2010/main" val="0"/>
+                <a14:useLocalDpi xmlns:a14="http://schemas.microsoft.com/office/drawing/2010/main" xmlns="" val="0"/>
               </a:ext>
             </a:extLst>
           </a:blip>
@@ -25162,14 +25151,14 @@
           <a:effectLst/>
           <a:extLst>
             <a:ext uri="{909E8E84-426E-40DD-AFC4-6F175D3DCCD1}">
-              <a14:hiddenFill xmlns:a14="http://schemas.microsoft.com/office/drawing/2010/main">
+              <a14:hiddenFill xmlns:a14="http://schemas.microsoft.com/office/drawing/2010/main" xmlns="">
                 <a:solidFill>
                   <a:schemeClr val="accent1"/>
                 </a:solidFill>
               </a14:hiddenFill>
             </a:ext>
             <a:ext uri="{91240B29-F687-4F45-9708-019B960494DF}">
-              <a14:hiddenLine xmlns:a14="http://schemas.microsoft.com/office/drawing/2010/main" w="9525">
+              <a14:hiddenLine xmlns:a14="http://schemas.microsoft.com/office/drawing/2010/main" xmlns="" w="9525">
                 <a:solidFill>
                   <a:schemeClr val="tx1"/>
                 </a:solidFill>
@@ -25179,7 +25168,7 @@
               </a14:hiddenLine>
             </a:ext>
             <a:ext uri="{AF507438-7753-43E0-B8FC-AC1667EBCBE1}">
-              <a14:hiddenEffects xmlns:a14="http://schemas.microsoft.com/office/drawing/2010/main">
+              <a14:hiddenEffects xmlns:a14="http://schemas.microsoft.com/office/drawing/2010/main" xmlns="">
                 <a:effectLst>
                   <a:outerShdw dist="35921" dir="2700000" algn="ctr" rotWithShape="0">
                     <a:schemeClr val="bg2"/>
@@ -25192,7 +25181,7 @@
       </p:pic>
       <p:pic>
         <p:nvPicPr>
-          <p:cNvPr id="1026" name="Picture 2" descr="http://html5course.telerik.com" title="Web Design with HTML5, CSS and JavaScript Free Course">
+          <p:cNvPr id="1026" name="Picture 2" descr="http://html5course.telerik.com">
             <a:hlinkClick r:id="rId2" tooltip="&quot;Web Design with HTML 5, CSS 3 and JavaScript&quot; course @ Telerik Academy"/>
           </p:cNvPr>
           <p:cNvPicPr>
@@ -25204,7 +25193,7 @@
           <a:blip r:embed="rId10" cstate="print">
             <a:extLst>
               <a:ext uri="{28A0092B-C50C-407E-A947-70E740481C1C}">
-                <a14:useLocalDpi xmlns:a14="http://schemas.microsoft.com/office/drawing/2010/main" val="0"/>
+                <a14:useLocalDpi xmlns:a14="http://schemas.microsoft.com/office/drawing/2010/main" xmlns="" val="0"/>
               </a:ext>
             </a:extLst>
           </a:blip>
@@ -25224,7 +25213,7 @@
           <a:noFill/>
           <a:extLst>
             <a:ext uri="{909E8E84-426E-40DD-AFC4-6F175D3DCCD1}">
-              <a14:hiddenFill xmlns:a14="http://schemas.microsoft.com/office/drawing/2010/main">
+              <a14:hiddenFill xmlns:a14="http://schemas.microsoft.com/office/drawing/2010/main" xmlns="">
                 <a:solidFill>
                   <a:srgbClr val="FFFFFF"/>
                 </a:solidFill>
@@ -25265,7 +25254,7 @@
     </p:spTree>
     <p:extLst>
       <p:ext uri="{BB962C8B-B14F-4D97-AF65-F5344CB8AC3E}">
-        <p14:creationId xmlns:p14="http://schemas.microsoft.com/office/powerpoint/2010/main" val="1528962803"/>
+        <p14:creationId xmlns:p14="http://schemas.microsoft.com/office/powerpoint/2010/main" xmlns="" val="1528962803"/>
       </p:ext>
     </p:extLst>
   </p:cSld>
@@ -26850,10 +26839,10 @@
           <p:nvPr/>
         </p:nvPicPr>
         <p:blipFill rotWithShape="1">
-          <a:blip r:embed="rId2">
+          <a:blip r:embed="rId2" cstate="print">
             <a:extLst>
               <a:ext uri="{28A0092B-C50C-407E-A947-70E740481C1C}">
-                <a14:useLocalDpi xmlns:a14="http://schemas.microsoft.com/office/drawing/2010/main" val="0"/>
+                <a14:useLocalDpi xmlns:a14="http://schemas.microsoft.com/office/drawing/2010/main" xmlns="" val="0"/>
               </a:ext>
             </a:extLst>
           </a:blip>
@@ -26873,7 +26862,7 @@
           <a:noFill/>
           <a:extLst>
             <a:ext uri="{909E8E84-426E-40DD-AFC4-6F175D3DCCD1}">
-              <a14:hiddenFill xmlns:a14="http://schemas.microsoft.com/office/drawing/2010/main">
+              <a14:hiddenFill xmlns:a14="http://schemas.microsoft.com/office/drawing/2010/main" xmlns="">
                 <a:solidFill>
                   <a:srgbClr val="FFFFFF"/>
                 </a:solidFill>

</xml_diff>